<commit_message>
Added Linktree to the deck
</commit_message>
<xml_diff>
--- a/deck/ArjunMenon-IntroGraphConnector.pptx
+++ b/deck/ArjunMenon-IntroGraphConnector.pptx
@@ -3004,6 +3004,36 @@
               </a14:hiddenFill>
             </a:ext>
           </a:extLst>
+        </p:spPr>
+      </p:pic>
+      <p:pic>
+        <p:nvPicPr>
+          <p:cNvPr id="21" name="Picture 20" descr="A qr code with a black background&#10;&#10;Description automatically generated">
+            <a:extLst>
+              <a:ext uri="{FF2B5EF4-FFF2-40B4-BE49-F238E27FC236}">
+                <a16:creationId xmlns:a16="http://schemas.microsoft.com/office/drawing/2014/main" id="{C0EE7ADF-5B94-0592-CAE7-BB7B095FA388}"/>
+              </a:ext>
+            </a:extLst>
+          </p:cNvPr>
+          <p:cNvPicPr>
+            <a:picLocks noChangeAspect="1"/>
+          </p:cNvPicPr>
+          <p:nvPr/>
+        </p:nvPicPr>
+        <p:blipFill>
+          <a:blip r:embed="rId15"/>
+          <a:stretch>
+            <a:fillRect/>
+          </a:stretch>
+        </p:blipFill>
+        <p:spPr>
+          <a:xfrm>
+            <a:off x="6968275" y="3622983"/>
+            <a:ext cx="1305024" cy="1305024"/>
+          </a:xfrm>
+          <a:prstGeom prst="rect">
+            <a:avLst/>
+          </a:prstGeom>
         </p:spPr>
       </p:pic>
     </p:spTree>
@@ -4079,6 +4109,21 @@
 </file>
 
 <file path=customXml/item1.xml><?xml version="1.0" encoding="utf-8"?>
+<p:properties xmlns:p="http://schemas.microsoft.com/office/2006/metadata/properties" xmlns:xsi="http://www.w3.org/2001/XMLSchema-instance" xmlns:pc="http://schemas.microsoft.com/office/infopath/2007/PartnerControls">
+  <documentManagement/>
+</p:properties>
+</file>
+
+<file path=customXml/item2.xml><?xml version="1.0" encoding="utf-8"?>
+<?mso-contentType ?>
+<FormTemplates xmlns="http://schemas.microsoft.com/sharepoint/v3/contenttype/forms">
+  <Display>DocumentLibraryForm</Display>
+  <Edit>DocumentLibraryForm</Edit>
+  <New>DocumentLibraryForm</New>
+</FormTemplates>
+</file>
+
+<file path=customXml/item3.xml><?xml version="1.0" encoding="utf-8"?>
 <ct:contentTypeSchema xmlns:ct="http://schemas.microsoft.com/office/2006/metadata/contentType" xmlns:ma="http://schemas.microsoft.com/office/2006/metadata/properties/metaAttributes" ct:_="" ma:_="" ma:contentTypeName="Dokument" ma:contentTypeID="0x0101001953E0CDE6A38E419236C03EEB01435C" ma:contentTypeVersion="7" ma:contentTypeDescription="Ein neues Dokument erstellen." ma:contentTypeScope="" ma:versionID="35377ed61abc787e6d78f6dd36362cda">
   <xsd:schema xmlns:xsd="http://www.w3.org/2001/XMLSchema" xmlns:xs="http://www.w3.org/2001/XMLSchema" xmlns:p="http://schemas.microsoft.com/office/2006/metadata/properties" xmlns:ns2="74098b8b-3ead-4c65-9f72-d36b5831b20e" xmlns:ns3="c25f9c22-fc1f-4454-8c46-2969b0535af5" targetNamespace="http://schemas.microsoft.com/office/2006/metadata/properties" ma:root="true" ma:fieldsID="77ed309eff22ef73c9fccc7a3e12d61f" ns2:_="" ns3:_="">
     <xsd:import namespace="74098b8b-3ead-4c65-9f72-d36b5831b20e"/>
@@ -4261,22 +4306,32 @@
 </ct:contentTypeSchema>
 </file>
 
-<file path=customXml/item2.xml><?xml version="1.0" encoding="utf-8"?>
-<?mso-contentType ?>
-<FormTemplates xmlns="http://schemas.microsoft.com/sharepoint/v3/contenttype/forms">
-  <Display>DocumentLibraryForm</Display>
-  <Edit>DocumentLibraryForm</Edit>
-  <New>DocumentLibraryForm</New>
-</FormTemplates>
+<file path=customXml/itemProps1.xml><?xml version="1.0" encoding="utf-8"?>
+<ds:datastoreItem xmlns:ds="http://schemas.openxmlformats.org/officeDocument/2006/customXml" ds:itemID="{89296970-E637-471F-86E2-950D4519AEC4}">
+  <ds:schemaRefs>
+    <ds:schemaRef ds:uri="http://schemas.microsoft.com/office/infopath/2007/PartnerControls"/>
+    <ds:schemaRef ds:uri="http://schemas.openxmlformats.org/package/2006/metadata/core-properties"/>
+    <ds:schemaRef ds:uri="http://schemas.microsoft.com/office/2006/metadata/properties"/>
+    <ds:schemaRef ds:uri="http://schemas.microsoft.com/office/2006/documentManagement/types"/>
+    <ds:schemaRef ds:uri="http://www.w3.org/XML/1998/namespace"/>
+    <ds:schemaRef ds:uri="http://purl.org/dc/terms/"/>
+    <ds:schemaRef ds:uri="http://purl.org/dc/elements/1.1/"/>
+    <ds:schemaRef ds:uri="c25f9c22-fc1f-4454-8c46-2969b0535af5"/>
+    <ds:schemaRef ds:uri="74098b8b-3ead-4c65-9f72-d36b5831b20e"/>
+    <ds:schemaRef ds:uri="http://purl.org/dc/dcmitype/"/>
+  </ds:schemaRefs>
+</ds:datastoreItem>
 </file>
 
-<file path=customXml/item3.xml><?xml version="1.0" encoding="utf-8"?>
-<p:properties xmlns:p="http://schemas.microsoft.com/office/2006/metadata/properties" xmlns:xsi="http://www.w3.org/2001/XMLSchema-instance" xmlns:pc="http://schemas.microsoft.com/office/infopath/2007/PartnerControls">
-  <documentManagement/>
-</p:properties>
+<file path=customXml/itemProps2.xml><?xml version="1.0" encoding="utf-8"?>
+<ds:datastoreItem xmlns:ds="http://schemas.openxmlformats.org/officeDocument/2006/customXml" ds:itemID="{D6CE178E-7963-4EFA-83EF-8E123369E092}">
+  <ds:schemaRefs>
+    <ds:schemaRef ds:uri="http://schemas.microsoft.com/sharepoint/v3/contenttype/forms"/>
+  </ds:schemaRefs>
+</ds:datastoreItem>
 </file>
 
-<file path=customXml/itemProps1.xml><?xml version="1.0" encoding="utf-8"?>
+<file path=customXml/itemProps3.xml><?xml version="1.0" encoding="utf-8"?>
 <ds:datastoreItem xmlns:ds="http://schemas.openxmlformats.org/officeDocument/2006/customXml" ds:itemID="{26056780-E2CD-484B-90C1-F30A19D8A5D9}">
   <ds:schemaRefs>
     <ds:schemaRef ds:uri="http://schemas.microsoft.com/office/2006/metadata/contentType"/>
@@ -4293,29 +4348,4 @@
     <ds:schemaRef ds:uri="http://schemas.microsoft.com/internal/obd"/>
   </ds:schemaRefs>
 </ds:datastoreItem>
-</file>
-
-<file path=customXml/itemProps2.xml><?xml version="1.0" encoding="utf-8"?>
-<ds:datastoreItem xmlns:ds="http://schemas.openxmlformats.org/officeDocument/2006/customXml" ds:itemID="{D6CE178E-7963-4EFA-83EF-8E123369E092}">
-  <ds:schemaRefs>
-    <ds:schemaRef ds:uri="http://schemas.microsoft.com/sharepoint/v3/contenttype/forms"/>
-  </ds:schemaRefs>
-</ds:datastoreItem>
-</file>
-
-<file path=customXml/itemProps3.xml><?xml version="1.0" encoding="utf-8"?>
-<ds:datastoreItem xmlns:ds="http://schemas.openxmlformats.org/officeDocument/2006/customXml" ds:itemID="{89296970-E637-471F-86E2-950D4519AEC4}">
-  <ds:schemaRefs>
-    <ds:schemaRef ds:uri="http://schemas.microsoft.com/office/infopath/2007/PartnerControls"/>
-    <ds:schemaRef ds:uri="http://schemas.openxmlformats.org/package/2006/metadata/core-properties"/>
-    <ds:schemaRef ds:uri="http://schemas.microsoft.com/office/2006/metadata/properties"/>
-    <ds:schemaRef ds:uri="http://schemas.microsoft.com/office/2006/documentManagement/types"/>
-    <ds:schemaRef ds:uri="http://www.w3.org/XML/1998/namespace"/>
-    <ds:schemaRef ds:uri="http://purl.org/dc/terms/"/>
-    <ds:schemaRef ds:uri="http://purl.org/dc/elements/1.1/"/>
-    <ds:schemaRef ds:uri="c25f9c22-fc1f-4454-8c46-2969b0535af5"/>
-    <ds:schemaRef ds:uri="74098b8b-3ead-4c65-9f72-d36b5831b20e"/>
-    <ds:schemaRef ds:uri="http://purl.org/dc/dcmitype/"/>
-  </ds:schemaRefs>
-</ds:datastoreItem>
 </file>
</xml_diff>